<commit_message>
New tutorials : "Create your Nodes" and "How to : fullscreen size"
</commit_message>
<xml_diff>
--- a/img/concepts.pptx
+++ b/img/concepts.pptx
@@ -9,7 +9,8 @@
     <p:sldId id="257" r:id="rId3"/>
     <p:sldId id="258" r:id="rId4"/>
     <p:sldId id="260" r:id="rId5"/>
-    <p:sldId id="259" r:id="rId6"/>
+    <p:sldId id="261" r:id="rId6"/>
+    <p:sldId id="259" r:id="rId7"/>
   </p:sldIdLst>
   <p:sldSz cx="9144000" cy="6858000" type="screen4x3"/>
   <p:notesSz cx="6858000" cy="9144000"/>
@@ -293,7 +294,7 @@
             <a:fld id="{AA309A6D-C09C-4548-B29A-6CF363A7E532}" type="datetimeFigureOut">
               <a:rPr lang="fr-FR" smtClean="0"/>
               <a:pPr/>
-              <a:t>13/11/2012</a:t>
+              <a:t>14/12/2012</a:t>
             </a:fld>
             <a:endParaRPr lang="fr-BE"/>
           </a:p>
@@ -460,7 +461,7 @@
             <a:fld id="{AA309A6D-C09C-4548-B29A-6CF363A7E532}" type="datetimeFigureOut">
               <a:rPr lang="fr-FR" smtClean="0"/>
               <a:pPr/>
-              <a:t>13/11/2012</a:t>
+              <a:t>14/12/2012</a:t>
             </a:fld>
             <a:endParaRPr lang="fr-BE"/>
           </a:p>
@@ -637,7 +638,7 @@
             <a:fld id="{AA309A6D-C09C-4548-B29A-6CF363A7E532}" type="datetimeFigureOut">
               <a:rPr lang="fr-FR" smtClean="0"/>
               <a:pPr/>
-              <a:t>13/11/2012</a:t>
+              <a:t>14/12/2012</a:t>
             </a:fld>
             <a:endParaRPr lang="fr-BE"/>
           </a:p>
@@ -804,7 +805,7 @@
             <a:fld id="{AA309A6D-C09C-4548-B29A-6CF363A7E532}" type="datetimeFigureOut">
               <a:rPr lang="fr-FR" smtClean="0"/>
               <a:pPr/>
-              <a:t>13/11/2012</a:t>
+              <a:t>14/12/2012</a:t>
             </a:fld>
             <a:endParaRPr lang="fr-BE"/>
           </a:p>
@@ -1047,7 +1048,7 @@
             <a:fld id="{AA309A6D-C09C-4548-B29A-6CF363A7E532}" type="datetimeFigureOut">
               <a:rPr lang="fr-FR" smtClean="0"/>
               <a:pPr/>
-              <a:t>13/11/2012</a:t>
+              <a:t>14/12/2012</a:t>
             </a:fld>
             <a:endParaRPr lang="fr-BE"/>
           </a:p>
@@ -1332,7 +1333,7 @@
             <a:fld id="{AA309A6D-C09C-4548-B29A-6CF363A7E532}" type="datetimeFigureOut">
               <a:rPr lang="fr-FR" smtClean="0"/>
               <a:pPr/>
-              <a:t>13/11/2012</a:t>
+              <a:t>14/12/2012</a:t>
             </a:fld>
             <a:endParaRPr lang="fr-BE"/>
           </a:p>
@@ -1751,7 +1752,7 @@
             <a:fld id="{AA309A6D-C09C-4548-B29A-6CF363A7E532}" type="datetimeFigureOut">
               <a:rPr lang="fr-FR" smtClean="0"/>
               <a:pPr/>
-              <a:t>13/11/2012</a:t>
+              <a:t>14/12/2012</a:t>
             </a:fld>
             <a:endParaRPr lang="fr-BE"/>
           </a:p>
@@ -1866,7 +1867,7 @@
             <a:fld id="{AA309A6D-C09C-4548-B29A-6CF363A7E532}" type="datetimeFigureOut">
               <a:rPr lang="fr-FR" smtClean="0"/>
               <a:pPr/>
-              <a:t>13/11/2012</a:t>
+              <a:t>14/12/2012</a:t>
             </a:fld>
             <a:endParaRPr lang="fr-BE"/>
           </a:p>
@@ -1958,7 +1959,7 @@
             <a:fld id="{AA309A6D-C09C-4548-B29A-6CF363A7E532}" type="datetimeFigureOut">
               <a:rPr lang="fr-FR" smtClean="0"/>
               <a:pPr/>
-              <a:t>13/11/2012</a:t>
+              <a:t>14/12/2012</a:t>
             </a:fld>
             <a:endParaRPr lang="fr-BE"/>
           </a:p>
@@ -2232,7 +2233,7 @@
             <a:fld id="{AA309A6D-C09C-4548-B29A-6CF363A7E532}" type="datetimeFigureOut">
               <a:rPr lang="fr-FR" smtClean="0"/>
               <a:pPr/>
-              <a:t>13/11/2012</a:t>
+              <a:t>14/12/2012</a:t>
             </a:fld>
             <a:endParaRPr lang="fr-BE"/>
           </a:p>
@@ -2482,7 +2483,7 @@
             <a:fld id="{AA309A6D-C09C-4548-B29A-6CF363A7E532}" type="datetimeFigureOut">
               <a:rPr lang="fr-FR" smtClean="0"/>
               <a:pPr/>
-              <a:t>13/11/2012</a:t>
+              <a:t>14/12/2012</a:t>
             </a:fld>
             <a:endParaRPr lang="fr-BE"/>
           </a:p>
@@ -2695,7 +2696,7 @@
             <a:fld id="{AA309A6D-C09C-4548-B29A-6CF363A7E532}" type="datetimeFigureOut">
               <a:rPr lang="fr-FR" smtClean="0"/>
               <a:pPr/>
-              <a:t>13/11/2012</a:t>
+              <a:t>14/12/2012</a:t>
             </a:fld>
             <a:endParaRPr lang="fr-BE"/>
           </a:p>
@@ -4145,17 +4146,8 @@
             <a:pPr algn="ctr"/>
             <a:r>
               <a:rPr lang="fr-FR" sz="1200" smtClean="0"/>
-              <a:t>(S R </a:t>
-            </a:r>
-            <a:r>
-              <a:rPr lang="fr-FR" sz="1200" smtClean="0"/>
-              <a:t>T</a:t>
-            </a:r>
-            <a:r>
-              <a:rPr lang="fr-FR" sz="1200" smtClean="0"/>
-              <a:t>)</a:t>
-            </a:r>
-            <a:endParaRPr lang="fr-FR" sz="1200" smtClean="0"/>
+              <a:t>(S R T)</a:t>
+            </a:r>
           </a:p>
         </p:txBody>
       </p:sp>
@@ -5136,17 +5128,7 @@
                 <a:latin typeface="Segoe UI Light" pitchFamily="34" charset="0"/>
                 <a:cs typeface="Aharoni" pitchFamily="2" charset="-79"/>
               </a:rPr>
-              <a:t>otation </a:t>
-            </a:r>
-            <a:r>
-              <a:rPr lang="fr-FR" sz="1400" smtClean="0">
-                <a:solidFill>
-                  <a:schemeClr val="bg1"/>
-                </a:solidFill>
-                <a:latin typeface="Segoe UI Light" pitchFamily="34" charset="0"/>
-                <a:cs typeface="Aharoni" pitchFamily="2" charset="-79"/>
-              </a:rPr>
-              <a:t>– </a:t>
+              <a:t>otation – </a:t>
             </a:r>
             <a:r>
               <a:rPr lang="fr-FR" sz="1400" b="1" smtClean="0">
@@ -5305,17 +5287,8 @@
             <a:pPr algn="ctr"/>
             <a:r>
               <a:rPr lang="fr-FR" sz="1200" smtClean="0"/>
-              <a:t>(S R </a:t>
-            </a:r>
-            <a:r>
-              <a:rPr lang="fr-FR" sz="1200" smtClean="0"/>
-              <a:t>T</a:t>
-            </a:r>
-            <a:r>
-              <a:rPr lang="fr-FR" sz="1200" smtClean="0"/>
-              <a:t>)</a:t>
-            </a:r>
-            <a:endParaRPr lang="fr-FR" sz="1200" smtClean="0"/>
+              <a:t>(S R T)</a:t>
+            </a:r>
           </a:p>
         </p:txBody>
       </p:sp>
@@ -5563,27 +5536,7 @@
                 <a:latin typeface="Segoe UI Light" pitchFamily="34" charset="0"/>
                 <a:cs typeface="Aharoni" pitchFamily="2" charset="-79"/>
               </a:rPr>
-              <a:t>Scale = </a:t>
-            </a:r>
-            <a:r>
-              <a:rPr lang="fr-FR" sz="1400" smtClean="0">
-                <a:solidFill>
-                  <a:schemeClr val="bg1"/>
-                </a:solidFill>
-                <a:latin typeface="Segoe UI Light" pitchFamily="34" charset="0"/>
-                <a:cs typeface="Aharoni" pitchFamily="2" charset="-79"/>
-              </a:rPr>
-              <a:t>{</a:t>
-            </a:r>
-            <a:r>
-              <a:rPr lang="fr-FR" sz="1400" smtClean="0">
-                <a:solidFill>
-                  <a:schemeClr val="bg1"/>
-                </a:solidFill>
-                <a:latin typeface="Segoe UI Light" pitchFamily="34" charset="0"/>
-                <a:cs typeface="Aharoni" pitchFamily="2" charset="-79"/>
-              </a:rPr>
-              <a:t>x:4, y:4}</a:t>
+              <a:t>Scale = {x:4, y:4}</a:t>
             </a:r>
             <a:endParaRPr lang="fr-FR" sz="1400">
               <a:solidFill>
@@ -5665,27 +5618,7 @@
                 <a:latin typeface="Segoe UI Light" pitchFamily="34" charset="0"/>
                 <a:cs typeface="Aharoni" pitchFamily="2" charset="-79"/>
               </a:rPr>
-              <a:t>Scale = </a:t>
-            </a:r>
-            <a:r>
-              <a:rPr lang="fr-FR" sz="1400" smtClean="0">
-                <a:solidFill>
-                  <a:schemeClr val="bg1"/>
-                </a:solidFill>
-                <a:latin typeface="Segoe UI Light" pitchFamily="34" charset="0"/>
-                <a:cs typeface="Aharoni" pitchFamily="2" charset="-79"/>
-              </a:rPr>
-              <a:t>{</a:t>
-            </a:r>
-            <a:r>
-              <a:rPr lang="fr-FR" sz="1400" smtClean="0">
-                <a:solidFill>
-                  <a:schemeClr val="bg1"/>
-                </a:solidFill>
-                <a:latin typeface="Segoe UI Light" pitchFamily="34" charset="0"/>
-                <a:cs typeface="Aharoni" pitchFamily="2" charset="-79"/>
-              </a:rPr>
-              <a:t>x:1, y:1}</a:t>
+              <a:t>Scale = {x:1, y:1}</a:t>
             </a:r>
             <a:endParaRPr lang="fr-FR" sz="1400">
               <a:solidFill>
@@ -5920,27 +5853,7 @@
                 <a:latin typeface="Segoe UI Light" pitchFamily="34" charset="0"/>
                 <a:cs typeface="Aharoni" pitchFamily="2" charset="-79"/>
               </a:rPr>
-              <a:t>Scale = </a:t>
-            </a:r>
-            <a:r>
-              <a:rPr lang="fr-FR" sz="1400" smtClean="0">
-                <a:solidFill>
-                  <a:schemeClr val="bg1"/>
-                </a:solidFill>
-                <a:latin typeface="Segoe UI Light" pitchFamily="34" charset="0"/>
-                <a:cs typeface="Aharoni" pitchFamily="2" charset="-79"/>
-              </a:rPr>
-              <a:t>{</a:t>
-            </a:r>
-            <a:r>
-              <a:rPr lang="fr-FR" sz="1400" smtClean="0">
-                <a:solidFill>
-                  <a:schemeClr val="bg1"/>
-                </a:solidFill>
-                <a:latin typeface="Segoe UI Light" pitchFamily="34" charset="0"/>
-                <a:cs typeface="Aharoni" pitchFamily="2" charset="-79"/>
-              </a:rPr>
-              <a:t>x:2, y:2} (2 = 4*0.5)</a:t>
+              <a:t>Scale = {x:2, y:2} (2 = 4*0.5)</a:t>
             </a:r>
             <a:endParaRPr lang="fr-FR" sz="1400">
               <a:solidFill>
@@ -5982,27 +5895,7 @@
                 <a:latin typeface="Segoe UI Light" pitchFamily="34" charset="0"/>
                 <a:cs typeface="Aharoni" pitchFamily="2" charset="-79"/>
               </a:rPr>
-              <a:t>Scale = </a:t>
-            </a:r>
-            <a:r>
-              <a:rPr lang="fr-FR" sz="1400" smtClean="0">
-                <a:solidFill>
-                  <a:schemeClr val="bg1"/>
-                </a:solidFill>
-                <a:latin typeface="Segoe UI Light" pitchFamily="34" charset="0"/>
-                <a:cs typeface="Aharoni" pitchFamily="2" charset="-79"/>
-              </a:rPr>
-              <a:t>{</a:t>
-            </a:r>
-            <a:r>
-              <a:rPr lang="fr-FR" sz="1400" smtClean="0">
-                <a:solidFill>
-                  <a:schemeClr val="bg1"/>
-                </a:solidFill>
-                <a:latin typeface="Segoe UI Light" pitchFamily="34" charset="0"/>
-                <a:cs typeface="Aharoni" pitchFamily="2" charset="-79"/>
-              </a:rPr>
-              <a:t>x:2, y:2} (2 = 1*2)</a:t>
+              <a:t>Scale = {x:2, y:2} (2 = 1*2)</a:t>
             </a:r>
             <a:endParaRPr lang="fr-FR" sz="1400">
               <a:solidFill>
@@ -6143,7 +6036,6 @@
               <a:rPr lang="fr-FR" sz="1200" smtClean="0"/>
               <a:t>(CGSGNode)</a:t>
             </a:r>
-            <a:endParaRPr lang="fr-FR" sz="1200" smtClean="0"/>
           </a:p>
         </p:txBody>
       </p:sp>
@@ -6212,6 +6104,450 @@
       </p:grpSpPr>
       <p:sp>
         <p:nvSpPr>
+          <p:cNvPr id="7" name="Ellipse 6"/>
+          <p:cNvSpPr/>
+          <p:nvPr/>
+        </p:nvSpPr>
+        <p:spPr>
+          <a:xfrm>
+            <a:off x="1403648" y="1340768"/>
+            <a:ext cx="1728192" cy="1728192"/>
+          </a:xfrm>
+          <a:prstGeom prst="ellipse">
+            <a:avLst/>
+          </a:prstGeom>
+        </p:spPr>
+        <p:style>
+          <a:lnRef idx="2">
+            <a:schemeClr val="accent1">
+              <a:shade val="50000"/>
+            </a:schemeClr>
+          </a:lnRef>
+          <a:fillRef idx="1">
+            <a:schemeClr val="accent1"/>
+          </a:fillRef>
+          <a:effectRef idx="0">
+            <a:schemeClr val="accent1"/>
+          </a:effectRef>
+          <a:fontRef idx="minor">
+            <a:schemeClr val="lt1"/>
+          </a:fontRef>
+        </p:style>
+        <p:txBody>
+          <a:bodyPr rtlCol="0" anchor="ctr"/>
+          <a:lstStyle/>
+          <a:p>
+            <a:pPr algn="ctr"/>
+            <a:endParaRPr lang="en-US">
+              <a:solidFill>
+                <a:schemeClr val="bg1"/>
+              </a:solidFill>
+            </a:endParaRPr>
+          </a:p>
+        </p:txBody>
+      </p:sp>
+      <p:sp>
+        <p:nvSpPr>
+          <p:cNvPr id="8" name="ZoneTexte 7"/>
+          <p:cNvSpPr txBox="1"/>
+          <p:nvPr/>
+        </p:nvSpPr>
+        <p:spPr>
+          <a:xfrm>
+            <a:off x="3919405" y="1835532"/>
+            <a:ext cx="692818" cy="369332"/>
+          </a:xfrm>
+          <a:prstGeom prst="rect">
+            <a:avLst/>
+          </a:prstGeom>
+          <a:noFill/>
+        </p:spPr>
+        <p:txBody>
+          <a:bodyPr wrap="none" rtlCol="0">
+            <a:spAutoFit/>
+          </a:bodyPr>
+          <a:lstStyle/>
+          <a:p>
+            <a:r>
+              <a:rPr lang="fr-FR" err="1" smtClean="0">
+                <a:solidFill>
+                  <a:schemeClr val="bg1"/>
+                </a:solidFill>
+              </a:rPr>
+              <a:t>Node</a:t>
+            </a:r>
+            <a:endParaRPr lang="en-US">
+              <a:solidFill>
+                <a:schemeClr val="bg1"/>
+              </a:solidFill>
+            </a:endParaRPr>
+          </a:p>
+        </p:txBody>
+      </p:sp>
+      <p:sp>
+        <p:nvSpPr>
+          <p:cNvPr id="9" name="ZoneTexte 8"/>
+          <p:cNvSpPr txBox="1"/>
+          <p:nvPr/>
+        </p:nvSpPr>
+        <p:spPr>
+          <a:xfrm>
+            <a:off x="3577519" y="2354396"/>
+            <a:ext cx="1498537" cy="646331"/>
+          </a:xfrm>
+          <a:prstGeom prst="rect">
+            <a:avLst/>
+          </a:prstGeom>
+          <a:noFill/>
+        </p:spPr>
+        <p:txBody>
+          <a:bodyPr wrap="square" rtlCol="0">
+            <a:spAutoFit/>
+          </a:bodyPr>
+          <a:lstStyle/>
+          <a:p>
+            <a:r>
+              <a:rPr lang="fr-FR" err="1" smtClean="0">
+                <a:solidFill>
+                  <a:schemeClr val="bg1"/>
+                </a:solidFill>
+              </a:rPr>
+              <a:t>Bounding</a:t>
+            </a:r>
+            <a:r>
+              <a:rPr lang="fr-FR" smtClean="0">
+                <a:solidFill>
+                  <a:schemeClr val="bg1"/>
+                </a:solidFill>
+              </a:rPr>
+              <a:t> box of the </a:t>
+            </a:r>
+            <a:r>
+              <a:rPr lang="fr-FR" err="1" smtClean="0">
+                <a:solidFill>
+                  <a:schemeClr val="bg1"/>
+                </a:solidFill>
+              </a:rPr>
+              <a:t>node</a:t>
+            </a:r>
+            <a:endParaRPr lang="en-US">
+              <a:solidFill>
+                <a:schemeClr val="bg1"/>
+              </a:solidFill>
+            </a:endParaRPr>
+          </a:p>
+        </p:txBody>
+      </p:sp>
+      <p:cxnSp>
+        <p:nvCxnSpPr>
+          <p:cNvPr id="10" name="Connecteur droit avec flèche 9"/>
+          <p:cNvCxnSpPr>
+            <a:stCxn id="9" idx="1"/>
+          </p:cNvCxnSpPr>
+          <p:nvPr/>
+        </p:nvCxnSpPr>
+        <p:spPr>
+          <a:xfrm flipH="1">
+            <a:off x="3131840" y="2677562"/>
+            <a:ext cx="445679" cy="0"/>
+          </a:xfrm>
+          <a:prstGeom prst="straightConnector1">
+            <a:avLst/>
+          </a:prstGeom>
+          <a:ln w="28575">
+            <a:solidFill>
+              <a:schemeClr val="accent6"/>
+            </a:solidFill>
+            <a:tailEnd type="arrow"/>
+          </a:ln>
+        </p:spPr>
+        <p:style>
+          <a:lnRef idx="1">
+            <a:schemeClr val="accent1"/>
+          </a:lnRef>
+          <a:fillRef idx="0">
+            <a:schemeClr val="accent1"/>
+          </a:fillRef>
+          <a:effectRef idx="0">
+            <a:schemeClr val="accent1"/>
+          </a:effectRef>
+          <a:fontRef idx="minor">
+            <a:schemeClr val="tx1"/>
+          </a:fontRef>
+        </p:style>
+      </p:cxnSp>
+      <p:cxnSp>
+        <p:nvCxnSpPr>
+          <p:cNvPr id="11" name="Connecteur droit avec flèche 10"/>
+          <p:cNvCxnSpPr>
+            <a:stCxn id="8" idx="1"/>
+          </p:cNvCxnSpPr>
+          <p:nvPr/>
+        </p:nvCxnSpPr>
+        <p:spPr>
+          <a:xfrm flipH="1">
+            <a:off x="2911293" y="2020198"/>
+            <a:ext cx="1008112" cy="0"/>
+          </a:xfrm>
+          <a:prstGeom prst="straightConnector1">
+            <a:avLst/>
+          </a:prstGeom>
+          <a:ln w="28575">
+            <a:solidFill>
+              <a:schemeClr val="accent6"/>
+            </a:solidFill>
+            <a:tailEnd type="arrow"/>
+          </a:ln>
+        </p:spPr>
+        <p:style>
+          <a:lnRef idx="1">
+            <a:schemeClr val="accent1"/>
+          </a:lnRef>
+          <a:fillRef idx="0">
+            <a:schemeClr val="accent1"/>
+          </a:fillRef>
+          <a:effectRef idx="0">
+            <a:schemeClr val="accent1"/>
+          </a:effectRef>
+          <a:fontRef idx="minor">
+            <a:schemeClr val="tx1"/>
+          </a:fontRef>
+        </p:style>
+      </p:cxnSp>
+      <p:sp>
+        <p:nvSpPr>
+          <p:cNvPr id="12" name="ZoneTexte 11"/>
+          <p:cNvSpPr txBox="1"/>
+          <p:nvPr/>
+        </p:nvSpPr>
+        <p:spPr>
+          <a:xfrm>
+            <a:off x="1223628" y="3140968"/>
+            <a:ext cx="2088231" cy="646331"/>
+          </a:xfrm>
+          <a:prstGeom prst="rect">
+            <a:avLst/>
+          </a:prstGeom>
+          <a:noFill/>
+        </p:spPr>
+        <p:txBody>
+          <a:bodyPr wrap="square" rtlCol="0">
+            <a:spAutoFit/>
+          </a:bodyPr>
+          <a:lstStyle/>
+          <a:p>
+            <a:pPr algn="ctr"/>
+            <a:r>
+              <a:rPr lang="fr-FR" sz="1200" err="1" smtClean="0">
+                <a:solidFill>
+                  <a:schemeClr val="bg1"/>
+                </a:solidFill>
+              </a:rPr>
+              <a:t>Every</a:t>
+            </a:r>
+            <a:r>
+              <a:rPr lang="fr-FR" sz="1200" smtClean="0">
+                <a:solidFill>
+                  <a:schemeClr val="bg1"/>
+                </a:solidFill>
+              </a:rPr>
+              <a:t> point </a:t>
+            </a:r>
+            <a:r>
+              <a:rPr lang="fr-FR" sz="1200" err="1" smtClean="0">
+                <a:solidFill>
+                  <a:schemeClr val="bg1"/>
+                </a:solidFill>
+              </a:rPr>
+              <a:t>inside</a:t>
+            </a:r>
+            <a:r>
+              <a:rPr lang="fr-FR" sz="1200" smtClean="0">
+                <a:solidFill>
+                  <a:schemeClr val="bg1"/>
+                </a:solidFill>
+              </a:rPr>
+              <a:t> the </a:t>
+            </a:r>
+            <a:r>
+              <a:rPr lang="fr-FR" sz="1200" err="1" smtClean="0">
+                <a:solidFill>
+                  <a:schemeClr val="bg1"/>
+                </a:solidFill>
+              </a:rPr>
+              <a:t>bounding</a:t>
+            </a:r>
+            <a:r>
+              <a:rPr lang="fr-FR" sz="1200" smtClean="0">
+                <a:solidFill>
+                  <a:schemeClr val="bg1"/>
+                </a:solidFill>
+              </a:rPr>
+              <a:t> box </a:t>
+            </a:r>
+            <a:r>
+              <a:rPr lang="fr-FR" sz="1200" err="1" smtClean="0">
+                <a:solidFill>
+                  <a:schemeClr val="bg1"/>
+                </a:solidFill>
+              </a:rPr>
+              <a:t>will</a:t>
+            </a:r>
+            <a:r>
+              <a:rPr lang="fr-FR" sz="1200" smtClean="0">
+                <a:solidFill>
+                  <a:schemeClr val="bg1"/>
+                </a:solidFill>
+              </a:rPr>
+              <a:t> </a:t>
+            </a:r>
+            <a:r>
+              <a:rPr lang="fr-FR" sz="1200" err="1" smtClean="0">
+                <a:solidFill>
+                  <a:schemeClr val="bg1"/>
+                </a:solidFill>
+              </a:rPr>
+              <a:t>be</a:t>
+            </a:r>
+            <a:r>
+              <a:rPr lang="fr-FR" sz="1200" smtClean="0">
+                <a:solidFill>
+                  <a:schemeClr val="bg1"/>
+                </a:solidFill>
+              </a:rPr>
+              <a:t> </a:t>
+            </a:r>
+            <a:r>
+              <a:rPr lang="fr-FR" sz="1200" err="1" smtClean="0">
+                <a:solidFill>
+                  <a:schemeClr val="bg1"/>
+                </a:solidFill>
+              </a:rPr>
+              <a:t>considered</a:t>
+            </a:r>
+            <a:r>
+              <a:rPr lang="fr-FR" sz="1200" smtClean="0">
+                <a:solidFill>
+                  <a:schemeClr val="bg1"/>
+                </a:solidFill>
+              </a:rPr>
+              <a:t> as </a:t>
+            </a:r>
+            <a:r>
+              <a:rPr lang="fr-FR" sz="1200" err="1" smtClean="0">
+                <a:solidFill>
+                  <a:schemeClr val="bg1"/>
+                </a:solidFill>
+              </a:rPr>
+              <a:t>inside</a:t>
+            </a:r>
+            <a:r>
+              <a:rPr lang="fr-FR" sz="1200" smtClean="0">
+                <a:solidFill>
+                  <a:schemeClr val="bg1"/>
+                </a:solidFill>
+              </a:rPr>
+              <a:t> the </a:t>
+            </a:r>
+            <a:r>
+              <a:rPr lang="fr-FR" sz="1200" err="1" smtClean="0">
+                <a:solidFill>
+                  <a:schemeClr val="bg1"/>
+                </a:solidFill>
+              </a:rPr>
+              <a:t>node</a:t>
+            </a:r>
+            <a:endParaRPr lang="en-US" sz="1200">
+              <a:solidFill>
+                <a:schemeClr val="bg1"/>
+              </a:solidFill>
+            </a:endParaRPr>
+          </a:p>
+        </p:txBody>
+      </p:sp>
+      <p:sp>
+        <p:nvSpPr>
+          <p:cNvPr id="6" name="Rectangle 5"/>
+          <p:cNvSpPr/>
+          <p:nvPr/>
+        </p:nvSpPr>
+        <p:spPr>
+          <a:xfrm>
+            <a:off x="1403648" y="1340768"/>
+            <a:ext cx="1728192" cy="1728192"/>
+          </a:xfrm>
+          <a:prstGeom prst="rect">
+            <a:avLst/>
+          </a:prstGeom>
+          <a:noFill/>
+          <a:ln>
+            <a:solidFill>
+              <a:schemeClr val="accent2">
+                <a:lumMod val="60000"/>
+                <a:lumOff val="40000"/>
+              </a:schemeClr>
+            </a:solidFill>
+          </a:ln>
+        </p:spPr>
+        <p:style>
+          <a:lnRef idx="2">
+            <a:schemeClr val="dk1"/>
+          </a:lnRef>
+          <a:fillRef idx="1">
+            <a:schemeClr val="lt1"/>
+          </a:fillRef>
+          <a:effectRef idx="0">
+            <a:schemeClr val="dk1"/>
+          </a:effectRef>
+          <a:fontRef idx="minor">
+            <a:schemeClr val="dk1"/>
+          </a:fontRef>
+        </p:style>
+        <p:txBody>
+          <a:bodyPr rtlCol="0" anchor="ctr"/>
+          <a:lstStyle/>
+          <a:p>
+            <a:pPr algn="ctr"/>
+            <a:endParaRPr lang="en-US">
+              <a:solidFill>
+                <a:schemeClr val="bg1"/>
+              </a:solidFill>
+            </a:endParaRPr>
+          </a:p>
+        </p:txBody>
+      </p:sp>
+    </p:spTree>
+    <p:extLst>
+      <p:ext uri="{BB962C8B-B14F-4D97-AF65-F5344CB8AC3E}">
+        <p14:creationId xmlns:p14="http://schemas.microsoft.com/office/powerpoint/2010/main" val="330286705"/>
+      </p:ext>
+    </p:extLst>
+  </p:cSld>
+  <p:clrMapOvr>
+    <a:masterClrMapping/>
+  </p:clrMapOvr>
+</p:sld>
+</file>
+
+<file path=ppt/slides/slide6.xml><?xml version="1.0" encoding="utf-8"?>
+<p:sld xmlns:a="http://schemas.openxmlformats.org/drawingml/2006/main" xmlns:r="http://schemas.openxmlformats.org/officeDocument/2006/relationships" xmlns:p="http://schemas.openxmlformats.org/presentationml/2006/main" showMasterSp="0">
+  <p:cSld>
+    <p:spTree>
+      <p:nvGrpSpPr>
+        <p:cNvPr id="1" name=""/>
+        <p:cNvGrpSpPr/>
+        <p:nvPr/>
+      </p:nvGrpSpPr>
+      <p:grpSpPr>
+        <a:xfrm>
+          <a:off x="0" y="0"/>
+          <a:ext cx="0" cy="0"/>
+          <a:chOff x="0" y="0"/>
+          <a:chExt cx="0" cy="0"/>
+        </a:xfrm>
+      </p:grpSpPr>
+      <p:sp>
+        <p:nvSpPr>
           <p:cNvPr id="49" name="ZoneTexte 48"/>
           <p:cNvSpPr txBox="1"/>
           <p:nvPr/>
@@ -6398,40 +6734,7 @@
                 </a:solidFill>
                 <a:cs typeface="Aharoni" pitchFamily="2" charset="-79"/>
               </a:rPr>
-              <a:t>"width = device-width, initial-scale = 1</a:t>
-            </a:r>
-            <a:r>
-              <a:rPr lang="fr-FR" sz="1100" smtClean="0">
-                <a:solidFill>
-                  <a:schemeClr val="accent3">
-                    <a:lumMod val="75000"/>
-                  </a:schemeClr>
-                </a:solidFill>
-                <a:cs typeface="Aharoni" pitchFamily="2" charset="-79"/>
-              </a:rPr>
-              <a:t>, </a:t>
-            </a:r>
-            <a:r>
-              <a:rPr lang="fr-FR" sz="1100" smtClean="0">
-                <a:solidFill>
-                  <a:schemeClr val="accent3">
-                    <a:lumMod val="75000"/>
-                  </a:schemeClr>
-                </a:solidFill>
-                <a:cs typeface="Aharoni" pitchFamily="2" charset="-79"/>
-              </a:rPr>
-              <a:t>minimum-scale </a:t>
-            </a:r>
-            <a:r>
-              <a:rPr lang="fr-FR" sz="1100" smtClean="0">
-                <a:solidFill>
-                  <a:schemeClr val="accent3">
-                    <a:lumMod val="75000"/>
-                  </a:schemeClr>
-                </a:solidFill>
-                <a:cs typeface="Aharoni" pitchFamily="2" charset="-79"/>
-              </a:rPr>
-              <a:t>= 1, maximum-scale = 1, user-scalable = no"</a:t>
+              <a:t>"width = device-width, initial-scale = 1, minimum-scale = 1, maximum-scale = 1, user-scalable = no"</a:t>
             </a:r>
             <a:r>
               <a:rPr lang="fr-FR" sz="1100" smtClean="0">
@@ -6470,7 +6773,16 @@
                 </a:solidFill>
                 <a:cs typeface="Aharoni" pitchFamily="2" charset="-79"/>
               </a:rPr>
-              <a:t>"text/javascript</a:t>
+              <a:t>"text/javascript"</a:t>
+            </a:r>
+            <a:r>
+              <a:rPr lang="fr-FR" sz="1100" smtClean="0">
+                <a:solidFill>
+                  <a:schemeClr val="tx1"/>
+                </a:solidFill>
+                <a:cs typeface="Aharoni" pitchFamily="2" charset="-79"/>
+              </a:rPr>
+              <a:t> src=</a:t>
             </a:r>
             <a:r>
               <a:rPr lang="fr-FR" sz="1100" smtClean="0">
@@ -6481,58 +6793,7 @@
                 </a:solidFill>
                 <a:cs typeface="Aharoni" pitchFamily="2" charset="-79"/>
               </a:rPr>
-              <a:t>"</a:t>
-            </a:r>
-            <a:r>
-              <a:rPr lang="fr-FR" sz="1100" smtClean="0">
-                <a:solidFill>
-                  <a:schemeClr val="tx1"/>
-                </a:solidFill>
-                <a:cs typeface="Aharoni" pitchFamily="2" charset="-79"/>
-              </a:rPr>
-              <a:t> </a:t>
-            </a:r>
-            <a:r>
-              <a:rPr lang="fr-FR" sz="1100" smtClean="0">
-                <a:solidFill>
-                  <a:schemeClr val="tx1"/>
-                </a:solidFill>
-                <a:cs typeface="Aharoni" pitchFamily="2" charset="-79"/>
-              </a:rPr>
-              <a:t>src=</a:t>
-            </a:r>
-            <a:r>
-              <a:rPr lang="fr-FR" sz="1100" smtClean="0">
-                <a:solidFill>
-                  <a:schemeClr val="accent3">
-                    <a:lumMod val="75000"/>
-                  </a:schemeClr>
-                </a:solidFill>
-                <a:cs typeface="Aharoni" pitchFamily="2" charset="-79"/>
-              </a:rPr>
-              <a:t>"</a:t>
-            </a:r>
-            <a:r>
-              <a:rPr lang="fr-FR" sz="1100" smtClean="0">
-                <a:solidFill>
-                  <a:schemeClr val="accent3">
-                    <a:lumMod val="75000"/>
-                  </a:schemeClr>
-                </a:solidFill>
-                <a:cs typeface="Aharoni" pitchFamily="2" charset="-79"/>
-              </a:rPr>
-              <a:t>js/cgscenegraph_1.2.1.min.js</a:t>
-            </a:r>
-            <a:r>
-              <a:rPr lang="fr-FR" sz="1100" smtClean="0">
-                <a:solidFill>
-                  <a:schemeClr val="accent3">
-                    <a:lumMod val="75000"/>
-                  </a:schemeClr>
-                </a:solidFill>
-                <a:cs typeface="Aharoni" pitchFamily="2" charset="-79"/>
-              </a:rPr>
-              <a:t>"</a:t>
+              <a:t>"js/cgscenegraph_1.2.1.min.js"</a:t>
             </a:r>
             <a:r>
               <a:rPr lang="fr-FR" sz="1100" smtClean="0">
@@ -6580,16 +6841,7 @@
                 </a:solidFill>
                 <a:cs typeface="Aharoni" pitchFamily="2" charset="-79"/>
               </a:rPr>
-              <a:t>  </a:t>
-            </a:r>
-            <a:r>
-              <a:rPr lang="fr-FR" sz="1100" smtClean="0">
-                <a:solidFill>
-                  <a:schemeClr val="tx1"/>
-                </a:solidFill>
-                <a:cs typeface="Aharoni" pitchFamily="2" charset="-79"/>
-              </a:rPr>
-              <a:t>  </a:t>
+              <a:t>    </a:t>
             </a:r>
             <a:r>
               <a:rPr lang="fr-FR" sz="1100" smtClean="0">
@@ -6600,12 +6852,6 @@
               </a:rPr>
               <a:t>//import other JS file here</a:t>
             </a:r>
-            <a:endParaRPr lang="fr-FR" sz="1100" smtClean="0">
-              <a:solidFill>
-                <a:srgbClr val="00B050"/>
-              </a:solidFill>
-              <a:cs typeface="Aharoni" pitchFamily="2" charset="-79"/>
-            </a:endParaRPr>
           </a:p>
           <a:p>
             <a:r>
@@ -6749,12 +6995,6 @@
               </a:rPr>
               <a:t>&gt;</a:t>
             </a:r>
-            <a:endParaRPr lang="fr-FR" sz="1100" smtClean="0">
-              <a:solidFill>
-                <a:schemeClr val="tx1"/>
-              </a:solidFill>
-              <a:cs typeface="Aharoni" pitchFamily="2" charset="-79"/>
-            </a:endParaRPr>
           </a:p>
           <a:p>
             <a:endParaRPr lang="fr-FR" sz="1100" smtClean="0">

</xml_diff>